<commit_message>
Added logic to demonstrate using a SAS Token URL for the template files in blob storage.
</commit_message>
<xml_diff>
--- a/Work on Your ARM Strength.pptx
+++ b/Work on Your ARM Strength.pptx
@@ -33581,7 +33581,7 @@
         <p:spPr>
           <a:xfrm>
             <a:off x="7943850" y="5257800"/>
-            <a:ext cx="3898194" cy="960263"/>
+            <a:ext cx="3898194" cy="1369606"/>
           </a:xfrm>
           <a:prstGeom prst="rect">
             <a:avLst/>
@@ -33609,6 +33609,24 @@
                 </a:solidFill>
               </a:rPr>
               <a:t>URLs must be publically accessible (not local files)</a:t>
+            </a:r>
+          </a:p>
+          <a:p>
+            <a:pPr>
+              <a:lnSpc>
+                <a:spcPct val="90000"/>
+              </a:lnSpc>
+              <a:spcAft>
+                <a:spcPts val="600"/>
+              </a:spcAft>
+            </a:pPr>
+            <a:r>
+              <a:rPr lang="en-US" sz="2400" dirty="0">
+                <a:solidFill>
+                  <a:srgbClr val="FF0000"/>
+                </a:solidFill>
+              </a:rPr>
+              <a:t>* SAS Token</a:t>
             </a:r>
           </a:p>
         </p:txBody>
@@ -40938,7 +40956,7 @@
         <p:spPr>
           <a:xfrm>
             <a:off x="4905375" y="5580060"/>
-            <a:ext cx="7286625" cy="627864"/>
+            <a:ext cx="7286625" cy="1037207"/>
           </a:xfrm>
           <a:prstGeom prst="rect">
             <a:avLst/>
@@ -40967,6 +40985,37 @@
               </a:rPr>
               <a:t>URLs must be publically accessible (not local files)</a:t>
             </a:r>
+          </a:p>
+          <a:p>
+            <a:pPr>
+              <a:lnSpc>
+                <a:spcPct val="90000"/>
+              </a:lnSpc>
+              <a:spcAft>
+                <a:spcPts val="600"/>
+              </a:spcAft>
+            </a:pPr>
+            <a:r>
+              <a:rPr lang="en-US" sz="2400">
+                <a:solidFill>
+                  <a:srgbClr val="FF0000"/>
+                </a:solidFill>
+              </a:rPr>
+              <a:t>* </a:t>
+            </a:r>
+            <a:r>
+              <a:rPr lang="en-US" sz="2400">
+                <a:solidFill>
+                  <a:srgbClr val="FF0000"/>
+                </a:solidFill>
+              </a:rPr>
+              <a:t>SAS Token</a:t>
+            </a:r>
+            <a:endParaRPr lang="en-US" sz="2400">
+              <a:solidFill>
+                <a:srgbClr val="FF0000"/>
+              </a:solidFill>
+            </a:endParaRPr>
           </a:p>
         </p:txBody>
       </p:sp>

</xml_diff>